<commit_message>
cache lab slides -- updated 7/18 to correct suggested format string (use %x for address)
</commit_message>
<xml_diff>
--- a/cs449_lab_7_7_20_and_7_9_20.pptx
+++ b/cs449_lab_7_7_20_and_7_9_20.pptx
@@ -232,7 +232,7 @@
           <a:p>
             <a:fld id="{64B53207-2DA4-4502-B9D8-268520D886D5}" type="datetimeFigureOut">
               <a:rPr lang="en-US" smtClean="0"/>
-              <a:t>7/7/2020</a:t>
+              <a:t>7/18/2020</a:t>
             </a:fld>
             <a:endParaRPr lang="en-US"/>
           </a:p>
@@ -714,7 +714,7 @@
           <a:p>
             <a:fld id="{C6810361-B20F-4EA5-8639-C36D0C4B430D}" type="datetime1">
               <a:rPr lang="en-US" smtClean="0"/>
-              <a:t>7/7/2020</a:t>
+              <a:t>7/18/2020</a:t>
             </a:fld>
             <a:endParaRPr lang="en-US" dirty="0"/>
           </a:p>
@@ -885,7 +885,7 @@
           <a:p>
             <a:fld id="{5A1C983F-CEFC-448A-A96D-1119C8B735A2}" type="datetime1">
               <a:rPr lang="en-US" smtClean="0"/>
-              <a:t>7/7/2020</a:t>
+              <a:t>7/18/2020</a:t>
             </a:fld>
             <a:endParaRPr lang="en-US" dirty="0"/>
           </a:p>
@@ -1065,7 +1065,7 @@
           <a:p>
             <a:fld id="{43B6CBE2-C557-4B76-AAE0-12A7D88DE4A5}" type="datetime1">
               <a:rPr lang="en-US" smtClean="0"/>
-              <a:t>7/7/2020</a:t>
+              <a:t>7/18/2020</a:t>
             </a:fld>
             <a:endParaRPr lang="en-US" dirty="0"/>
           </a:p>
@@ -1235,7 +1235,7 @@
           <a:p>
             <a:fld id="{6EC55AB0-8555-492B-889C-9C3CE0765D5F}" type="datetime1">
               <a:rPr lang="en-US" smtClean="0"/>
-              <a:t>7/7/2020</a:t>
+              <a:t>7/18/2020</a:t>
             </a:fld>
             <a:endParaRPr lang="en-US" dirty="0"/>
           </a:p>
@@ -1479,7 +1479,7 @@
           <a:p>
             <a:fld id="{30650972-75DC-4185-AE97-0366BB751D52}" type="datetime1">
               <a:rPr lang="en-US" smtClean="0"/>
-              <a:t>7/7/2020</a:t>
+              <a:t>7/18/2020</a:t>
             </a:fld>
             <a:endParaRPr lang="en-US" dirty="0"/>
           </a:p>
@@ -1712,7 +1712,7 @@
           <a:p>
             <a:fld id="{C50A2E03-F89F-4C70-B928-D6F8CA29040F}" type="datetime1">
               <a:rPr lang="en-US" smtClean="0"/>
-              <a:t>7/7/2020</a:t>
+              <a:t>7/18/2020</a:t>
             </a:fld>
             <a:endParaRPr lang="en-US" dirty="0"/>
           </a:p>
@@ -2079,7 +2079,7 @@
           <a:p>
             <a:fld id="{5F5A84F1-E2C1-4251-8264-833ED38B95DC}" type="datetime1">
               <a:rPr lang="en-US" smtClean="0"/>
-              <a:t>7/7/2020</a:t>
+              <a:t>7/18/2020</a:t>
             </a:fld>
             <a:endParaRPr lang="en-US" dirty="0"/>
           </a:p>
@@ -2197,7 +2197,7 @@
           <a:p>
             <a:fld id="{75DC4EEB-E328-4B14-BBF0-8275371CB8DA}" type="datetime1">
               <a:rPr lang="en-US" smtClean="0"/>
-              <a:t>7/7/2020</a:t>
+              <a:t>7/18/2020</a:t>
             </a:fld>
             <a:endParaRPr lang="en-US" dirty="0"/>
           </a:p>
@@ -2292,7 +2292,7 @@
           <a:p>
             <a:fld id="{871E9F16-0F7F-4EA5-9D96-3E55F41A707B}" type="datetime1">
               <a:rPr lang="en-US" smtClean="0"/>
-              <a:t>7/7/2020</a:t>
+              <a:t>7/18/2020</a:t>
             </a:fld>
             <a:endParaRPr lang="en-US" dirty="0"/>
           </a:p>
@@ -2569,7 +2569,7 @@
           <a:p>
             <a:fld id="{8F052073-9859-40BA-B74F-9B60BF7A3CB6}" type="datetime1">
               <a:rPr lang="en-US" smtClean="0"/>
-              <a:t>7/7/2020</a:t>
+              <a:t>7/18/2020</a:t>
             </a:fld>
             <a:endParaRPr lang="en-US" dirty="0"/>
           </a:p>
@@ -2827,7 +2827,7 @@
           <a:p>
             <a:fld id="{E9FFB24C-90D4-40EE-A426-D68137023CD0}" type="datetime1">
               <a:rPr lang="en-US" smtClean="0"/>
-              <a:t>7/7/2020</a:t>
+              <a:t>7/18/2020</a:t>
             </a:fld>
             <a:endParaRPr lang="en-US" dirty="0"/>
           </a:p>
@@ -3041,7 +3041,7 @@
           <a:p>
             <a:fld id="{8FA885C3-D677-43B0-BA79-6E753B62A8D9}" type="datetime1">
               <a:rPr lang="en-US" smtClean="0"/>
-              <a:t>7/7/2020</a:t>
+              <a:t>7/18/2020</a:t>
             </a:fld>
             <a:endParaRPr lang="en-US" dirty="0"/>
           </a:p>
@@ -5359,11 +5359,27 @@
           <a:p>
             <a:r>
               <a:rPr lang="en-US" dirty="0"/>
-              <a:t>The lines in the trace files appear to take a form like “ %c %</a:t>
+              <a:t>The lines in the trace files appear to take a form like “ %c </a:t>
+            </a:r>
+            <a:r>
+              <a:rPr lang="en-US" dirty="0">
+                <a:solidFill>
+                  <a:srgbClr val="FF0000"/>
+                </a:solidFill>
+              </a:rPr>
+              <a:t>%</a:t>
+            </a:r>
+            <a:r>
+              <a:rPr lang="en-US" dirty="0" err="1">
+                <a:solidFill>
+                  <a:srgbClr val="FF0000"/>
+                </a:solidFill>
+              </a:rPr>
+              <a:t>x</a:t>
             </a:r>
             <a:r>
               <a:rPr lang="en-US" dirty="0" err="1"/>
-              <a:t>d,%d</a:t>
+              <a:t>,%d</a:t>
             </a:r>
             <a:r>
               <a:rPr lang="en-US" dirty="0"/>
@@ -5414,6 +5430,61 @@
           </a:prstGeom>
         </p:spPr>
       </p:pic>
+      <p:sp>
+        <p:nvSpPr>
+          <p:cNvPr id="7" name="TextBox 6">
+            <a:extLst>
+              <a:ext uri="{FF2B5EF4-FFF2-40B4-BE49-F238E27FC236}">
+                <a16:creationId xmlns:a16="http://schemas.microsoft.com/office/drawing/2014/main" id="{A52219D9-879E-4A90-A05A-438E9E3EA23B}"/>
+              </a:ext>
+            </a:extLst>
+          </p:cNvPr>
+          <p:cNvSpPr txBox="1"/>
+          <p:nvPr/>
+        </p:nvSpPr>
+        <p:spPr>
+          <a:xfrm>
+            <a:off x="4470400" y="3657600"/>
+            <a:ext cx="2365829" cy="923330"/>
+          </a:xfrm>
+          <a:prstGeom prst="rect">
+            <a:avLst/>
+          </a:prstGeom>
+          <a:noFill/>
+        </p:spPr>
+        <p:txBody>
+          <a:bodyPr wrap="square" rtlCol="0">
+            <a:spAutoFit/>
+          </a:bodyPr>
+          <a:lstStyle/>
+          <a:p>
+            <a:r>
+              <a:rPr lang="en-US" dirty="0">
+                <a:solidFill>
+                  <a:srgbClr val="0070C0"/>
+                </a:solidFill>
+              </a:rPr>
+              <a:t>Correction on 7/18: replaced %</a:t>
+            </a:r>
+            <a:r>
+              <a:rPr lang="en-US" dirty="0" err="1">
+                <a:solidFill>
+                  <a:srgbClr val="0070C0"/>
+                </a:solidFill>
+              </a:rPr>
+              <a:t>d,%d</a:t>
+            </a:r>
+            <a:r>
+              <a:rPr lang="en-US" dirty="0">
+                <a:solidFill>
+                  <a:srgbClr val="0070C0"/>
+                </a:solidFill>
+              </a:rPr>
+              <a:t> with %x, %d </a:t>
+            </a:r>
+          </a:p>
+        </p:txBody>
+      </p:sp>
     </p:spTree>
     <p:extLst>
       <p:ext uri="{BB962C8B-B14F-4D97-AF65-F5344CB8AC3E}">

</xml_diff>

<commit_message>
cache lab - another correction - use %llx, not %x
</commit_message>
<xml_diff>
--- a/cs449_lab_7_7_20_and_7_9_20.pptx
+++ b/cs449_lab_7_7_20_and_7_9_20.pptx
@@ -232,7 +232,7 @@
           <a:p>
             <a:fld id="{64B53207-2DA4-4502-B9D8-268520D886D5}" type="datetimeFigureOut">
               <a:rPr lang="en-US" smtClean="0"/>
-              <a:t>7/18/2020</a:t>
+              <a:t>7/19/2020</a:t>
             </a:fld>
             <a:endParaRPr lang="en-US"/>
           </a:p>
@@ -714,7 +714,7 @@
           <a:p>
             <a:fld id="{C6810361-B20F-4EA5-8639-C36D0C4B430D}" type="datetime1">
               <a:rPr lang="en-US" smtClean="0"/>
-              <a:t>7/18/2020</a:t>
+              <a:t>7/19/2020</a:t>
             </a:fld>
             <a:endParaRPr lang="en-US" dirty="0"/>
           </a:p>
@@ -885,7 +885,7 @@
           <a:p>
             <a:fld id="{5A1C983F-CEFC-448A-A96D-1119C8B735A2}" type="datetime1">
               <a:rPr lang="en-US" smtClean="0"/>
-              <a:t>7/18/2020</a:t>
+              <a:t>7/19/2020</a:t>
             </a:fld>
             <a:endParaRPr lang="en-US" dirty="0"/>
           </a:p>
@@ -1065,7 +1065,7 @@
           <a:p>
             <a:fld id="{43B6CBE2-C557-4B76-AAE0-12A7D88DE4A5}" type="datetime1">
               <a:rPr lang="en-US" smtClean="0"/>
-              <a:t>7/18/2020</a:t>
+              <a:t>7/19/2020</a:t>
             </a:fld>
             <a:endParaRPr lang="en-US" dirty="0"/>
           </a:p>
@@ -1235,7 +1235,7 @@
           <a:p>
             <a:fld id="{6EC55AB0-8555-492B-889C-9C3CE0765D5F}" type="datetime1">
               <a:rPr lang="en-US" smtClean="0"/>
-              <a:t>7/18/2020</a:t>
+              <a:t>7/19/2020</a:t>
             </a:fld>
             <a:endParaRPr lang="en-US" dirty="0"/>
           </a:p>
@@ -1479,7 +1479,7 @@
           <a:p>
             <a:fld id="{30650972-75DC-4185-AE97-0366BB751D52}" type="datetime1">
               <a:rPr lang="en-US" smtClean="0"/>
-              <a:t>7/18/2020</a:t>
+              <a:t>7/19/2020</a:t>
             </a:fld>
             <a:endParaRPr lang="en-US" dirty="0"/>
           </a:p>
@@ -1712,7 +1712,7 @@
           <a:p>
             <a:fld id="{C50A2E03-F89F-4C70-B928-D6F8CA29040F}" type="datetime1">
               <a:rPr lang="en-US" smtClean="0"/>
-              <a:t>7/18/2020</a:t>
+              <a:t>7/19/2020</a:t>
             </a:fld>
             <a:endParaRPr lang="en-US" dirty="0"/>
           </a:p>
@@ -2079,7 +2079,7 @@
           <a:p>
             <a:fld id="{5F5A84F1-E2C1-4251-8264-833ED38B95DC}" type="datetime1">
               <a:rPr lang="en-US" smtClean="0"/>
-              <a:t>7/18/2020</a:t>
+              <a:t>7/19/2020</a:t>
             </a:fld>
             <a:endParaRPr lang="en-US" dirty="0"/>
           </a:p>
@@ -2197,7 +2197,7 @@
           <a:p>
             <a:fld id="{75DC4EEB-E328-4B14-BBF0-8275371CB8DA}" type="datetime1">
               <a:rPr lang="en-US" smtClean="0"/>
-              <a:t>7/18/2020</a:t>
+              <a:t>7/19/2020</a:t>
             </a:fld>
             <a:endParaRPr lang="en-US" dirty="0"/>
           </a:p>
@@ -2292,7 +2292,7 @@
           <a:p>
             <a:fld id="{871E9F16-0F7F-4EA5-9D96-3E55F41A707B}" type="datetime1">
               <a:rPr lang="en-US" smtClean="0"/>
-              <a:t>7/18/2020</a:t>
+              <a:t>7/19/2020</a:t>
             </a:fld>
             <a:endParaRPr lang="en-US" dirty="0"/>
           </a:p>
@@ -2569,7 +2569,7 @@
           <a:p>
             <a:fld id="{8F052073-9859-40BA-B74F-9B60BF7A3CB6}" type="datetime1">
               <a:rPr lang="en-US" smtClean="0"/>
-              <a:t>7/18/2020</a:t>
+              <a:t>7/19/2020</a:t>
             </a:fld>
             <a:endParaRPr lang="en-US" dirty="0"/>
           </a:p>
@@ -2827,7 +2827,7 @@
           <a:p>
             <a:fld id="{E9FFB24C-90D4-40EE-A426-D68137023CD0}" type="datetime1">
               <a:rPr lang="en-US" smtClean="0"/>
-              <a:t>7/18/2020</a:t>
+              <a:t>7/19/2020</a:t>
             </a:fld>
             <a:endParaRPr lang="en-US" dirty="0"/>
           </a:p>
@@ -3041,7 +3041,7 @@
           <a:p>
             <a:fld id="{8FA885C3-D677-43B0-BA79-6E753B62A8D9}" type="datetime1">
               <a:rPr lang="en-US" smtClean="0"/>
-              <a:t>7/18/2020</a:t>
+              <a:t>7/19/2020</a:t>
             </a:fld>
             <a:endParaRPr lang="en-US" dirty="0"/>
           </a:p>
@@ -5358,11 +5358,11 @@
           </a:p>
           <a:p>
             <a:r>
-              <a:rPr lang="en-US" dirty="0"/>
+              <a:rPr lang="en-US" strike="sngStrike" dirty="0"/>
               <a:t>The lines in the trace files appear to take a form like “ %c </a:t>
             </a:r>
             <a:r>
-              <a:rPr lang="en-US" dirty="0">
+              <a:rPr lang="en-US" strike="sngStrike" dirty="0">
                 <a:solidFill>
                   <a:srgbClr val="FF0000"/>
                 </a:solidFill>
@@ -5370,7 +5370,7 @@
               <a:t>%</a:t>
             </a:r>
             <a:r>
-              <a:rPr lang="en-US" dirty="0" err="1">
+              <a:rPr lang="en-US" strike="sngStrike" dirty="0" err="1">
                 <a:solidFill>
                   <a:srgbClr val="FF0000"/>
                 </a:solidFill>
@@ -5378,11 +5378,11 @@
               <a:t>x</a:t>
             </a:r>
             <a:r>
-              <a:rPr lang="en-US" dirty="0" err="1"/>
+              <a:rPr lang="en-US" strike="sngStrike" dirty="0" err="1"/>
               <a:t>,%d</a:t>
             </a:r>
             <a:r>
-              <a:rPr lang="en-US" dirty="0"/>
+              <a:rPr lang="en-US" strike="sngStrike" dirty="0"/>
               <a:t>”</a:t>
             </a:r>
           </a:p>
@@ -5445,7 +5445,7 @@
         <p:spPr>
           <a:xfrm>
             <a:off x="4470400" y="3657600"/>
-            <a:ext cx="2365829" cy="923330"/>
+            <a:ext cx="2365829" cy="646331"/>
           </a:xfrm>
           <a:prstGeom prst="rect">
             <a:avLst/>
@@ -5464,7 +5464,7 @@
                   <a:srgbClr val="0070C0"/>
                 </a:solidFill>
               </a:rPr>
-              <a:t>Correction on 7/18: replaced %</a:t>
+              <a:t>Correction- the string to use is %c %</a:t>
             </a:r>
             <a:r>
               <a:rPr lang="en-US" dirty="0" err="1">
@@ -5472,7 +5472,7 @@
                   <a:srgbClr val="0070C0"/>
                 </a:solidFill>
               </a:rPr>
-              <a:t>d,%d</a:t>
+              <a:t>llx</a:t>
             </a:r>
             <a:r>
               <a:rPr lang="en-US" dirty="0">
@@ -5480,7 +5480,7 @@
                   <a:srgbClr val="0070C0"/>
                 </a:solidFill>
               </a:rPr>
-              <a:t> with %x, %d </a:t>
+              <a:t>, %u</a:t>
             </a:r>
           </a:p>
         </p:txBody>

</xml_diff>